<commit_message>
fixed class to document
</commit_message>
<xml_diff>
--- a/docs/week2/exercises/gradle.pptx
+++ b/docs/week2/exercises/gradle.pptx
@@ -425,7 +425,7 @@
           <a:p>
             <a:fld id="{A79867D3-72B3-441F-A7E3-3E28E7844781}" type="datetimeFigureOut">
               <a:rPr lang="de-CH" smtClean="0"/>
-              <a:t>02.10.2019</a:t>
+              <a:t>06.10.2021</a:t>
             </a:fld>
             <a:endParaRPr lang="de-CH"/>
           </a:p>
@@ -922,7 +922,7 @@
           <a:p>
             <a:fld id="{A79867D3-72B3-441F-A7E3-3E28E7844781}" type="datetimeFigureOut">
               <a:rPr lang="de-CH" smtClean="0"/>
-              <a:t>02.10.2019</a:t>
+              <a:t>06.10.2021</a:t>
             </a:fld>
             <a:endParaRPr lang="de-CH"/>
           </a:p>
@@ -1040,7 +1040,7 @@
           <a:p>
             <a:fld id="{A79867D3-72B3-441F-A7E3-3E28E7844781}" type="datetimeFigureOut">
               <a:rPr lang="de-CH" smtClean="0"/>
-              <a:t>02.10.2019</a:t>
+              <a:t>06.10.2021</a:t>
             </a:fld>
             <a:endParaRPr lang="de-CH"/>
           </a:p>
@@ -1259,7 +1259,7 @@
           <a:p>
             <a:fld id="{A79867D3-72B3-441F-A7E3-3E28E7844781}" type="datetimeFigureOut">
               <a:rPr lang="de-CH" smtClean="0"/>
-              <a:t>02.10.2019</a:t>
+              <a:t>06.10.2021</a:t>
             </a:fld>
             <a:endParaRPr lang="de-CH"/>
           </a:p>
@@ -1579,7 +1579,7 @@
           <a:p>
             <a:fld id="{A79867D3-72B3-441F-A7E3-3E28E7844781}" type="datetimeFigureOut">
               <a:rPr lang="de-CH" smtClean="0"/>
-              <a:t>02.10.2019</a:t>
+              <a:t>06.10.2021</a:t>
             </a:fld>
             <a:endParaRPr lang="de-CH"/>
           </a:p>
@@ -1977,7 +1977,7 @@
           <a:p>
             <a:fld id="{A79867D3-72B3-441F-A7E3-3E28E7844781}" type="datetimeFigureOut">
               <a:rPr lang="de-CH" smtClean="0"/>
-              <a:t>02.10.2019</a:t>
+              <a:t>06.10.2021</a:t>
             </a:fld>
             <a:endParaRPr lang="de-CH"/>
           </a:p>
@@ -2254,7 +2254,7 @@
           <a:p>
             <a:fld id="{A79867D3-72B3-441F-A7E3-3E28E7844781}" type="datetimeFigureOut">
               <a:rPr lang="de-CH" smtClean="0"/>
-              <a:t>02.10.2019</a:t>
+              <a:t>06.10.2021</a:t>
             </a:fld>
             <a:endParaRPr lang="de-CH"/>
           </a:p>
@@ -2463,7 +2463,7 @@
           <a:p>
             <a:fld id="{A79867D3-72B3-441F-A7E3-3E28E7844781}" type="datetimeFigureOut">
               <a:rPr lang="de-CH" smtClean="0"/>
-              <a:t>02.10.2019</a:t>
+              <a:t>06.10.2021</a:t>
             </a:fld>
             <a:endParaRPr lang="de-CH"/>
           </a:p>
@@ -6146,8 +6146,8 @@
           </a:p>
         </p:txBody>
       </p:sp>
-      <mc:AlternateContent xmlns:mc="http://schemas.openxmlformats.org/markup-compatibility/2006">
-        <mc:Choice xmlns:a14="http://schemas.microsoft.com/office/drawing/2010/main" Requires="a14">
+      <mc:AlternateContent xmlns:mc="http://schemas.openxmlformats.org/markup-compatibility/2006" xmlns:a14="http://schemas.microsoft.com/office/drawing/2010/main">
+        <mc:Choice Requires="a14">
           <p:sp>
             <p:nvSpPr>
               <p:cNvPr id="6" name="TextBox 5">
@@ -6207,7 +6207,7 @@
             </p:txBody>
           </p:sp>
         </mc:Choice>
-        <mc:Fallback>
+        <mc:Fallback xmlns="">
           <p:sp>
             <p:nvSpPr>
               <p:cNvPr id="6" name="TextBox 5">
@@ -6252,8 +6252,8 @@
           </p:sp>
         </mc:Fallback>
       </mc:AlternateContent>
-      <mc:AlternateContent xmlns:mc="http://schemas.openxmlformats.org/markup-compatibility/2006">
-        <mc:Choice xmlns:a14="http://schemas.microsoft.com/office/drawing/2010/main" Requires="a14">
+      <mc:AlternateContent xmlns:mc="http://schemas.openxmlformats.org/markup-compatibility/2006" xmlns:a14="http://schemas.microsoft.com/office/drawing/2010/main">
+        <mc:Choice Requires="a14">
           <p:sp>
             <p:nvSpPr>
               <p:cNvPr id="7" name="TextBox 6">
@@ -6305,7 +6305,7 @@
             </p:txBody>
           </p:sp>
         </mc:Choice>
-        <mc:Fallback>
+        <mc:Fallback xmlns="">
           <p:sp>
             <p:nvSpPr>
               <p:cNvPr id="7" name="TextBox 6">
@@ -9504,20 +9504,29 @@
               <a:gd name="adj4" fmla="val -41981"/>
             </a:avLst>
           </a:prstGeom>
-          <a:ln/>
+          <a:noFill/>
+          <a:ln w="9525" cap="flat" cmpd="sng" algn="ctr">
+            <a:solidFill>
+              <a:schemeClr val="accent4"/>
+            </a:solidFill>
+            <a:prstDash val="solid"/>
+            <a:round/>
+            <a:headEnd type="none" w="med" len="med"/>
+            <a:tailEnd type="none" w="med" len="med"/>
+          </a:ln>
         </p:spPr>
         <p:style>
-          <a:lnRef idx="2">
-            <a:schemeClr val="accent3"/>
+          <a:lnRef idx="0">
+            <a:scrgbClr r="0" g="0" b="0"/>
           </a:lnRef>
-          <a:fillRef idx="1">
-            <a:schemeClr val="lt1"/>
+          <a:fillRef idx="0">
+            <a:scrgbClr r="0" g="0" b="0"/>
           </a:fillRef>
           <a:effectRef idx="0">
-            <a:schemeClr val="accent3"/>
+            <a:scrgbClr r="0" g="0" b="0"/>
           </a:effectRef>
           <a:fontRef idx="minor">
-            <a:schemeClr val="dk1"/>
+            <a:schemeClr val="accent4"/>
           </a:fontRef>
         </p:style>
         <p:txBody>
@@ -9597,20 +9606,29 @@
               <a:gd name="adj4" fmla="val -44717"/>
             </a:avLst>
           </a:prstGeom>
-          <a:ln/>
+          <a:noFill/>
+          <a:ln w="9525" cap="flat" cmpd="sng" algn="ctr">
+            <a:solidFill>
+              <a:schemeClr val="accent4"/>
+            </a:solidFill>
+            <a:prstDash val="solid"/>
+            <a:round/>
+            <a:headEnd type="none" w="med" len="med"/>
+            <a:tailEnd type="none" w="med" len="med"/>
+          </a:ln>
         </p:spPr>
         <p:style>
-          <a:lnRef idx="2">
-            <a:schemeClr val="accent3"/>
+          <a:lnRef idx="0">
+            <a:scrgbClr r="0" g="0" b="0"/>
           </a:lnRef>
-          <a:fillRef idx="1">
-            <a:schemeClr val="lt1"/>
+          <a:fillRef idx="0">
+            <a:scrgbClr r="0" g="0" b="0"/>
           </a:fillRef>
           <a:effectRef idx="0">
-            <a:schemeClr val="accent3"/>
+            <a:scrgbClr r="0" g="0" b="0"/>
           </a:effectRef>
           <a:fontRef idx="minor">
-            <a:schemeClr val="dk1"/>
+            <a:schemeClr val="accent4"/>
           </a:fontRef>
         </p:style>
         <p:txBody>
@@ -9848,59 +9866,6 @@
               <a:t>Gradle</a:t>
             </a:r>
             <a:endParaRPr lang="de-CH" sz="1200" dirty="0"/>
-          </a:p>
-        </p:txBody>
-      </p:sp>
-      <p:sp>
-        <p:nvSpPr>
-          <p:cNvPr id="20" name="Callout: Line with Border and Accent Bar 19">
-            <a:extLst>
-              <a:ext uri="{FF2B5EF4-FFF2-40B4-BE49-F238E27FC236}">
-                <a16:creationId xmlns:a16="http://schemas.microsoft.com/office/drawing/2014/main" id="{E5129A5A-4CF4-4C82-AFDF-9131A0D1007D}"/>
-              </a:ext>
-            </a:extLst>
-          </p:cNvPr>
-          <p:cNvSpPr/>
-          <p:nvPr/>
-        </p:nvSpPr>
-        <p:spPr>
-          <a:xfrm>
-            <a:off x="10430256" y="4832694"/>
-            <a:ext cx="1481328" cy="542544"/>
-          </a:xfrm>
-          <a:prstGeom prst="accentBorderCallout1">
-            <a:avLst>
-              <a:gd name="adj1" fmla="val 18750"/>
-              <a:gd name="adj2" fmla="val -8333"/>
-              <a:gd name="adj3" fmla="val -92542"/>
-              <a:gd name="adj4" fmla="val -93303"/>
-            </a:avLst>
-          </a:prstGeom>
-          <a:ln/>
-        </p:spPr>
-        <p:style>
-          <a:lnRef idx="2">
-            <a:schemeClr val="accent3"/>
-          </a:lnRef>
-          <a:fillRef idx="1">
-            <a:schemeClr val="lt1"/>
-          </a:fillRef>
-          <a:effectRef idx="0">
-            <a:schemeClr val="accent3"/>
-          </a:effectRef>
-          <a:fontRef idx="minor">
-            <a:schemeClr val="dk1"/>
-          </a:fontRef>
-        </p:style>
-        <p:txBody>
-          <a:bodyPr rtlCol="0" anchor="ctr"/>
-          <a:lstStyle/>
-          <a:p>
-            <a:pPr algn="ctr"/>
-            <a:r>
-              <a:rPr lang="de-CH" sz="1200" dirty="0"/>
-              <a:t>SBT</a:t>
-            </a:r>
           </a:p>
         </p:txBody>
       </p:sp>

</xml_diff>